<commit_message>
change tool from node to simple html/javascript
</commit_message>
<xml_diff>
--- a/presentation/presentation.pptx
+++ b/presentation/presentation.pptx
@@ -5,10 +5,10 @@
     <p:sldMasterId id="2147483660" r:id="rId4"/>
   </p:sldMasterIdLst>
   <p:notesMasterIdLst>
-    <p:notesMasterId r:id="rId14"/>
+    <p:notesMasterId r:id="rId15"/>
   </p:notesMasterIdLst>
   <p:handoutMasterIdLst>
-    <p:handoutMasterId r:id="rId15"/>
+    <p:handoutMasterId r:id="rId16"/>
   </p:handoutMasterIdLst>
   <p:sldIdLst>
     <p:sldId id="257" r:id="rId5"/>
@@ -20,6 +20,7 @@
     <p:sldId id="277" r:id="rId11"/>
     <p:sldId id="278" r:id="rId12"/>
     <p:sldId id="279" r:id="rId13"/>
+    <p:sldId id="280" r:id="rId14"/>
   </p:sldIdLst>
   <p:sldSz cx="12188825" cy="6858000"/>
   <p:notesSz cx="6858000" cy="9144000"/>
@@ -149,6 +150,10 @@
     </p:ext>
   </p:extLst>
 </p:presentation>
+</file>
+
+<file path=ppt/revisionInfo.xml><?xml version="1.0" encoding="utf-8"?>
+<p1510:revInfo xmlns:a="http://schemas.openxmlformats.org/drawingml/2006/main" xmlns:r="http://schemas.openxmlformats.org/officeDocument/2006/relationships" xmlns:p1510="http://schemas.microsoft.com/office/powerpoint/2015/10/main"/>
 </file>
 
 <file path=ppt/handoutMasters/handoutMaster1.xml><?xml version="1.0" encoding="utf-8"?>
@@ -5227,6 +5232,115 @@
     <p:extLst>
       <p:ext uri="{BB962C8B-B14F-4D97-AF65-F5344CB8AC3E}">
         <p14:creationId xmlns:p14="http://schemas.microsoft.com/office/powerpoint/2010/main" val="1332291891"/>
+      </p:ext>
+    </p:extLst>
+  </p:cSld>
+  <p:clrMapOvr>
+    <a:masterClrMapping/>
+  </p:clrMapOvr>
+  <mc:AlternateContent xmlns:mc="http://schemas.openxmlformats.org/markup-compatibility/2006" xmlns:p14="http://schemas.microsoft.com/office/powerpoint/2010/main">
+    <mc:Choice Requires="p14">
+      <p:transition spd="med" p14:dur="700">
+        <p:fade/>
+      </p:transition>
+    </mc:Choice>
+    <mc:Fallback xmlns="">
+      <p:transition spd="med">
+        <p:fade/>
+      </p:transition>
+    </mc:Fallback>
+  </mc:AlternateContent>
+</p:sld>
+</file>
+
+<file path=ppt/slides/slide10.xml><?xml version="1.0" encoding="utf-8"?>
+<p:sld xmlns:a="http://schemas.openxmlformats.org/drawingml/2006/main" xmlns:r="http://schemas.openxmlformats.org/officeDocument/2006/relationships" xmlns:p="http://schemas.openxmlformats.org/presentationml/2006/main" showMasterSp="0">
+  <p:cSld>
+    <p:spTree>
+      <p:nvGrpSpPr>
+        <p:cNvPr id="1" name=""/>
+        <p:cNvGrpSpPr/>
+        <p:nvPr/>
+      </p:nvGrpSpPr>
+      <p:grpSpPr>
+        <a:xfrm>
+          <a:off x="0" y="0"/>
+          <a:ext cx="0" cy="0"/>
+          <a:chOff x="0" y="0"/>
+          <a:chExt cx="0" cy="0"/>
+        </a:xfrm>
+      </p:grpSpPr>
+      <p:sp>
+        <p:nvSpPr>
+          <p:cNvPr id="2" name="Title 1"/>
+          <p:cNvSpPr>
+            <a:spLocks noGrp="1"/>
+          </p:cNvSpPr>
+          <p:nvPr>
+            <p:ph type="title"/>
+          </p:nvPr>
+        </p:nvSpPr>
+        <p:spPr/>
+        <p:txBody>
+          <a:bodyPr/>
+          <a:lstStyle/>
+          <a:p>
+            <a:r>
+              <a:rPr lang="en-US" sz="4400" dirty="0">
+                <a:solidFill>
+                  <a:schemeClr val="accent1"/>
+                </a:solidFill>
+              </a:rPr>
+              <a:t>Questions?</a:t>
+            </a:r>
+            <a:endParaRPr lang="en-US" dirty="0">
+              <a:solidFill>
+                <a:schemeClr val="accent1"/>
+              </a:solidFill>
+            </a:endParaRPr>
+          </a:p>
+        </p:txBody>
+      </p:sp>
+      <p:sp>
+        <p:nvSpPr>
+          <p:cNvPr id="3" name="Content Placeholder 2"/>
+          <p:cNvSpPr>
+            <a:spLocks noGrp="1"/>
+          </p:cNvSpPr>
+          <p:nvPr>
+            <p:ph sz="half" idx="1"/>
+          </p:nvPr>
+        </p:nvSpPr>
+        <p:spPr>
+          <a:xfrm>
+            <a:off x="1218883" y="1600200"/>
+            <a:ext cx="9752329" cy="4770120"/>
+          </a:xfrm>
+        </p:spPr>
+        <p:txBody>
+          <a:bodyPr>
+            <a:normAutofit/>
+          </a:bodyPr>
+          <a:lstStyle/>
+          <a:p>
+            <a:pPr lvl="1"/>
+            <a:endParaRPr lang="en-US" sz="2800" dirty="0"/>
+          </a:p>
+          <a:p>
+            <a:pPr marL="377886" lvl="1" indent="0">
+              <a:buNone/>
+            </a:pPr>
+            <a:endParaRPr lang="en-US" sz="2800" dirty="0"/>
+          </a:p>
+          <a:p>
+            <a:endParaRPr lang="en-US" sz="3200" dirty="0"/>
+          </a:p>
+        </p:txBody>
+      </p:sp>
+    </p:spTree>
+    <p:extLst>
+      <p:ext uri="{BB962C8B-B14F-4D97-AF65-F5344CB8AC3E}">
+        <p14:creationId xmlns:p14="http://schemas.microsoft.com/office/powerpoint/2010/main" val="836484012"/>
       </p:ext>
     </p:extLst>
   </p:cSld>
@@ -7289,6 +7403,151 @@
 </file>
 
 <file path=customXml/item1.xml><?xml version="1.0" encoding="utf-8"?>
+<p:properties xmlns:p="http://schemas.microsoft.com/office/2006/metadata/properties" xmlns:xsi="http://www.w3.org/2001/XMLSchema-instance" xmlns:pc="http://schemas.microsoft.com/office/infopath/2007/PartnerControls">
+  <documentManagement>
+    <LocPublishedLinkedAssetsLookup xmlns="4873beb7-5857-4685-be1f-d57550cc96cc" xsi:nil="true"/>
+    <ApprovalStatus xmlns="4873beb7-5857-4685-be1f-d57550cc96cc">InProgress</ApprovalStatus>
+    <MarketSpecific xmlns="4873beb7-5857-4685-be1f-d57550cc96cc">false</MarketSpecific>
+    <LocComments xmlns="4873beb7-5857-4685-be1f-d57550cc96cc" xsi:nil="true"/>
+    <LocLastLocAttemptVersionTypeLookup xmlns="4873beb7-5857-4685-be1f-d57550cc96cc" xsi:nil="true"/>
+    <DirectSourceMarket xmlns="4873beb7-5857-4685-be1f-d57550cc96cc" xsi:nil="true"/>
+    <ThumbnailAssetId xmlns="4873beb7-5857-4685-be1f-d57550cc96cc" xsi:nil="true"/>
+    <PrimaryImageGen xmlns="4873beb7-5857-4685-be1f-d57550cc96cc">false</PrimaryImageGen>
+    <LocNewPublishedVersionLookup xmlns="4873beb7-5857-4685-be1f-d57550cc96cc" xsi:nil="true"/>
+    <LegacyData xmlns="4873beb7-5857-4685-be1f-d57550cc96cc" xsi:nil="true"/>
+    <LocRecommendedHandoff xmlns="4873beb7-5857-4685-be1f-d57550cc96cc" xsi:nil="true"/>
+    <BusinessGroup xmlns="4873beb7-5857-4685-be1f-d57550cc96cc" xsi:nil="true"/>
+    <BlockPublish xmlns="4873beb7-5857-4685-be1f-d57550cc96cc">false</BlockPublish>
+    <TPFriendlyName xmlns="4873beb7-5857-4685-be1f-d57550cc96cc" xsi:nil="true"/>
+    <LocOverallPublishStatusLookup xmlns="4873beb7-5857-4685-be1f-d57550cc96cc" xsi:nil="true"/>
+    <NumericId xmlns="4873beb7-5857-4685-be1f-d57550cc96cc" xsi:nil="true"/>
+    <APEditor xmlns="4873beb7-5857-4685-be1f-d57550cc96cc">
+      <UserInfo>
+        <DisplayName/>
+        <AccountId xsi:nil="true"/>
+        <AccountType/>
+      </UserInfo>
+    </APEditor>
+    <SourceTitle xmlns="4873beb7-5857-4685-be1f-d57550cc96cc" xsi:nil="true"/>
+    <OpenTemplate xmlns="4873beb7-5857-4685-be1f-d57550cc96cc">true</OpenTemplate>
+    <LocOverallLocStatusLookup xmlns="4873beb7-5857-4685-be1f-d57550cc96cc" xsi:nil="true"/>
+    <UALocComments xmlns="4873beb7-5857-4685-be1f-d57550cc96cc" xsi:nil="true"/>
+    <ParentAssetId xmlns="4873beb7-5857-4685-be1f-d57550cc96cc" xsi:nil="true"/>
+    <IntlLangReviewDate xmlns="4873beb7-5857-4685-be1f-d57550cc96cc" xsi:nil="true"/>
+    <FeatureTagsTaxHTField0 xmlns="4873beb7-5857-4685-be1f-d57550cc96cc">
+      <Terms xmlns="http://schemas.microsoft.com/office/infopath/2007/PartnerControls"/>
+    </FeatureTagsTaxHTField0>
+    <PublishStatusLookup xmlns="4873beb7-5857-4685-be1f-d57550cc96cc">
+      <Value>1345093</Value>
+    </PublishStatusLookup>
+    <Providers xmlns="4873beb7-5857-4685-be1f-d57550cc96cc" xsi:nil="true"/>
+    <MachineTranslated xmlns="4873beb7-5857-4685-be1f-d57550cc96cc">false</MachineTranslated>
+    <OriginalSourceMarket xmlns="4873beb7-5857-4685-be1f-d57550cc96cc" xsi:nil="true"/>
+    <APDescription xmlns="4873beb7-5857-4685-be1f-d57550cc96cc">This simple template design works for technology and  businesses, but it's versatile enough to use in other contexts.  It features multiple slide layouts designed for widescreen (16x9 resolution) and includes a sample SmartArt list and chart that are easily editable.</APDescription>
+    <ClipArtFilename xmlns="4873beb7-5857-4685-be1f-d57550cc96cc" xsi:nil="true"/>
+    <ContentItem xmlns="4873beb7-5857-4685-be1f-d57550cc96cc" xsi:nil="true"/>
+    <TPInstallLocation xmlns="4873beb7-5857-4685-be1f-d57550cc96cc" xsi:nil="true"/>
+    <PublishTargets xmlns="4873beb7-5857-4685-be1f-d57550cc96cc">OfficeOnlineVNext</PublishTargets>
+    <TimesCloned xmlns="4873beb7-5857-4685-be1f-d57550cc96cc" xsi:nil="true"/>
+    <AssetStart xmlns="4873beb7-5857-4685-be1f-d57550cc96cc">2011-11-26T00:30:00+00:00</AssetStart>
+    <Provider xmlns="4873beb7-5857-4685-be1f-d57550cc96cc" xsi:nil="true"/>
+    <AcquiredFrom xmlns="4873beb7-5857-4685-be1f-d57550cc96cc">Internal MS</AcquiredFrom>
+    <FriendlyTitle xmlns="4873beb7-5857-4685-be1f-d57550cc96cc" xsi:nil="true"/>
+    <LastHandOff xmlns="4873beb7-5857-4685-be1f-d57550cc96cc" xsi:nil="true"/>
+    <TPClientViewer xmlns="4873beb7-5857-4685-be1f-d57550cc96cc" xsi:nil="true"/>
+    <TemplateStatus xmlns="4873beb7-5857-4685-be1f-d57550cc96cc">Complete</TemplateStatus>
+    <Downloads xmlns="4873beb7-5857-4685-be1f-d57550cc96cc">0</Downloads>
+    <OOCacheId xmlns="4873beb7-5857-4685-be1f-d57550cc96cc" xsi:nil="true"/>
+    <IsDeleted xmlns="4873beb7-5857-4685-be1f-d57550cc96cc">false</IsDeleted>
+    <LocPublishedDependentAssetsLookup xmlns="4873beb7-5857-4685-be1f-d57550cc96cc" xsi:nil="true"/>
+    <TPExecutable xmlns="4873beb7-5857-4685-be1f-d57550cc96cc" xsi:nil="true"/>
+    <EditorialTags xmlns="4873beb7-5857-4685-be1f-d57550cc96cc" xsi:nil="true"/>
+    <SubmitterId xmlns="4873beb7-5857-4685-be1f-d57550cc96cc" xsi:nil="true"/>
+    <ApprovalLog xmlns="4873beb7-5857-4685-be1f-d57550cc96cc" xsi:nil="true"/>
+    <AssetType xmlns="4873beb7-5857-4685-be1f-d57550cc96cc">TP</AssetType>
+    <BugNumber xmlns="4873beb7-5857-4685-be1f-d57550cc96cc" xsi:nil="true"/>
+    <CSXSubmissionDate xmlns="4873beb7-5857-4685-be1f-d57550cc96cc" xsi:nil="true"/>
+    <CSXUpdate xmlns="4873beb7-5857-4685-be1f-d57550cc96cc">false</CSXUpdate>
+    <Milestone xmlns="4873beb7-5857-4685-be1f-d57550cc96cc" xsi:nil="true"/>
+    <RecommendationsModifier xmlns="4873beb7-5857-4685-be1f-d57550cc96cc" xsi:nil="true"/>
+    <OriginAsset xmlns="4873beb7-5857-4685-be1f-d57550cc96cc" xsi:nil="true"/>
+    <TPComponent xmlns="4873beb7-5857-4685-be1f-d57550cc96cc" xsi:nil="true"/>
+    <AssetId xmlns="4873beb7-5857-4685-be1f-d57550cc96cc">TP102787989</AssetId>
+    <IntlLocPriority xmlns="4873beb7-5857-4685-be1f-d57550cc96cc" xsi:nil="true"/>
+    <PolicheckWords xmlns="4873beb7-5857-4685-be1f-d57550cc96cc" xsi:nil="true"/>
+    <TPLaunchHelpLink xmlns="4873beb7-5857-4685-be1f-d57550cc96cc" xsi:nil="true"/>
+    <TPApplication xmlns="4873beb7-5857-4685-be1f-d57550cc96cc" xsi:nil="true"/>
+    <CrawlForDependencies xmlns="4873beb7-5857-4685-be1f-d57550cc96cc">false</CrawlForDependencies>
+    <HandoffToMSDN xmlns="4873beb7-5857-4685-be1f-d57550cc96cc" xsi:nil="true"/>
+    <PlannedPubDate xmlns="4873beb7-5857-4685-be1f-d57550cc96cc" xsi:nil="true"/>
+    <IntlLangReviewer xmlns="4873beb7-5857-4685-be1f-d57550cc96cc" xsi:nil="true"/>
+    <TrustLevel xmlns="4873beb7-5857-4685-be1f-d57550cc96cc">1 Microsoft Managed Content</TrustLevel>
+    <LocLastLocAttemptVersionLookup xmlns="4873beb7-5857-4685-be1f-d57550cc96cc">694266</LocLastLocAttemptVersionLookup>
+    <LocProcessedForHandoffsLookup xmlns="4873beb7-5857-4685-be1f-d57550cc96cc" xsi:nil="true"/>
+    <IsSearchable xmlns="4873beb7-5857-4685-be1f-d57550cc96cc">true</IsSearchable>
+    <TemplateTemplateType xmlns="4873beb7-5857-4685-be1f-d57550cc96cc">PowerPoint Presentation Template</TemplateTemplateType>
+    <CampaignTagsTaxHTField0 xmlns="4873beb7-5857-4685-be1f-d57550cc96cc">
+      <Terms xmlns="http://schemas.microsoft.com/office/infopath/2007/PartnerControls"/>
+    </CampaignTagsTaxHTField0>
+    <TPNamespace xmlns="4873beb7-5857-4685-be1f-d57550cc96cc" xsi:nil="true"/>
+    <LocOverallPreviewStatusLookup xmlns="4873beb7-5857-4685-be1f-d57550cc96cc" xsi:nil="true"/>
+    <TaxCatchAll xmlns="4873beb7-5857-4685-be1f-d57550cc96cc"/>
+    <Markets xmlns="4873beb7-5857-4685-be1f-d57550cc96cc"/>
+    <UAProjectedTotalWords xmlns="4873beb7-5857-4685-be1f-d57550cc96cc" xsi:nil="true"/>
+    <IntlLangReview xmlns="4873beb7-5857-4685-be1f-d57550cc96cc" xsi:nil="true"/>
+    <OutputCachingOn xmlns="4873beb7-5857-4685-be1f-d57550cc96cc">false</OutputCachingOn>
+    <AverageRating xmlns="4873beb7-5857-4685-be1f-d57550cc96cc" xsi:nil="true"/>
+    <APAuthor xmlns="4873beb7-5857-4685-be1f-d57550cc96cc">
+      <UserInfo>
+        <DisplayName>REDMOND\kristaa</DisplayName>
+        <AccountId>136</AccountId>
+        <AccountType/>
+      </UserInfo>
+    </APAuthor>
+    <LocManualTestRequired xmlns="4873beb7-5857-4685-be1f-d57550cc96cc">false</LocManualTestRequired>
+    <TPCommandLine xmlns="4873beb7-5857-4685-be1f-d57550cc96cc" xsi:nil="true"/>
+    <TPAppVersion xmlns="4873beb7-5857-4685-be1f-d57550cc96cc" xsi:nil="true"/>
+    <EditorialStatus xmlns="4873beb7-5857-4685-be1f-d57550cc96cc">Complete</EditorialStatus>
+    <LastModifiedDateTime xmlns="4873beb7-5857-4685-be1f-d57550cc96cc" xsi:nil="true"/>
+    <ScenarioTagsTaxHTField0 xmlns="4873beb7-5857-4685-be1f-d57550cc96cc">
+      <Terms xmlns="http://schemas.microsoft.com/office/infopath/2007/PartnerControls"/>
+    </ScenarioTagsTaxHTField0>
+    <LocProcessedForMarketsLookup xmlns="4873beb7-5857-4685-be1f-d57550cc96cc" xsi:nil="true"/>
+    <TPLaunchHelpLinkType xmlns="4873beb7-5857-4685-be1f-d57550cc96cc">Template</TPLaunchHelpLinkType>
+    <OriginalRelease xmlns="4873beb7-5857-4685-be1f-d57550cc96cc">15</OriginalRelease>
+    <LocalizationTagsTaxHTField0 xmlns="4873beb7-5857-4685-be1f-d57550cc96cc">
+      <Terms xmlns="http://schemas.microsoft.com/office/infopath/2007/PartnerControls"/>
+    </LocalizationTagsTaxHTField0>
+    <UACurrentWords xmlns="4873beb7-5857-4685-be1f-d57550cc96cc" xsi:nil="true"/>
+    <ArtSampleDocs xmlns="4873beb7-5857-4685-be1f-d57550cc96cc" xsi:nil="true"/>
+    <UALocRecommendation xmlns="4873beb7-5857-4685-be1f-d57550cc96cc">Localize</UALocRecommendation>
+    <Manager xmlns="4873beb7-5857-4685-be1f-d57550cc96cc" xsi:nil="true"/>
+    <LocOverallHandbackStatusLookup xmlns="4873beb7-5857-4685-be1f-d57550cc96cc" xsi:nil="true"/>
+    <ShowIn xmlns="4873beb7-5857-4685-be1f-d57550cc96cc">Show everywhere</ShowIn>
+    <UANotes xmlns="4873beb7-5857-4685-be1f-d57550cc96cc" xsi:nil="true"/>
+    <InternalTagsTaxHTField0 xmlns="4873beb7-5857-4685-be1f-d57550cc96cc">
+      <Terms xmlns="http://schemas.microsoft.com/office/infopath/2007/PartnerControls"/>
+    </InternalTagsTaxHTField0>
+    <CSXHash xmlns="4873beb7-5857-4685-be1f-d57550cc96cc" xsi:nil="true"/>
+    <VoteCount xmlns="4873beb7-5857-4685-be1f-d57550cc96cc" xsi:nil="true"/>
+    <AssetExpire xmlns="4873beb7-5857-4685-be1f-d57550cc96cc">2029-05-12T07:00:00+00:00</AssetExpire>
+    <DSATActionTaken xmlns="4873beb7-5857-4685-be1f-d57550cc96cc" xsi:nil="true"/>
+    <CSXSubmissionMarket xmlns="4873beb7-5857-4685-be1f-d57550cc96cc" xsi:nil="true"/>
+    <LocMarketGroupTiers2 xmlns="4873beb7-5857-4685-be1f-d57550cc96cc" xsi:nil="true"/>
+  </documentManagement>
+</p:properties>
+</file>
+
+<file path=customXml/item2.xml><?xml version="1.0" encoding="utf-8"?>
+<?mso-contentType ?>
+<FormTemplates xmlns="http://schemas.microsoft.com/sharepoint/v3/contenttype/forms">
+  <Display>DocumentLibraryForm</Display>
+  <Edit>AssetEditForm</Edit>
+  <New>DocumentLibraryForm</New>
+</FormTemplates>
+</file>
+
+<file path=customXml/item3.xml><?xml version="1.0" encoding="utf-8"?>
 <ct:contentTypeSchema xmlns:ct="http://schemas.microsoft.com/office/2006/metadata/contentType" xmlns:ma="http://schemas.microsoft.com/office/2006/metadata/properties/metaAttributes" ct:_="" ma:_="" ma:contentTypeName="TemplateFile" ma:contentTypeID="0x0101006EDDDB5EE6D98C44930B742096920B300400F5B6D36B3EF94B4E9A635CDF2A18F5B8" ma:contentTypeVersion="72" ma:contentTypeDescription="Create a new document." ma:contentTypeScope="" ma:versionID="a23e56308344d904b51738559c3d67c9">
   <xsd:schema xmlns:xsd="http://www.w3.org/2001/XMLSchema" xmlns:xs="http://www.w3.org/2001/XMLSchema" xmlns:p="http://schemas.microsoft.com/office/2006/metadata/properties" xmlns:ns2="4873beb7-5857-4685-be1f-d57550cc96cc" targetNamespace="http://schemas.microsoft.com/office/2006/metadata/properties" ma:root="true" ma:fieldsID="cd0908cc4600e77bf5da051303e00c8d" ns2:_="">
     <xsd:import namespace="4873beb7-5857-4685-be1f-d57550cc96cc"/>
@@ -8328,152 +8587,31 @@
 </ct:contentTypeSchema>
 </file>
 
-<file path=customXml/item2.xml><?xml version="1.0" encoding="utf-8"?>
-<?mso-contentType ?>
-<FormTemplates xmlns="http://schemas.microsoft.com/sharepoint/v3/contenttype/forms">
-  <Display>DocumentLibraryForm</Display>
-  <Edit>AssetEditForm</Edit>
-  <New>DocumentLibraryForm</New>
-</FormTemplates>
+<file path=customXml/itemProps1.xml><?xml version="1.0" encoding="utf-8"?>
+<ds:datastoreItem xmlns:ds="http://schemas.openxmlformats.org/officeDocument/2006/customXml" ds:itemID="{60C67BEE-D13F-4BD2-98A5-34D8A0977F68}">
+  <ds:schemaRefs>
+    <ds:schemaRef ds:uri="http://purl.org/dc/terms/"/>
+    <ds:schemaRef ds:uri="http://purl.org/dc/dcmitype/"/>
+    <ds:schemaRef ds:uri="4873beb7-5857-4685-be1f-d57550cc96cc"/>
+    <ds:schemaRef ds:uri="http://purl.org/dc/elements/1.1/"/>
+    <ds:schemaRef ds:uri="http://schemas.microsoft.com/office/2006/metadata/properties"/>
+    <ds:schemaRef ds:uri="http://schemas.microsoft.com/office/2006/documentManagement/types"/>
+    <ds:schemaRef ds:uri="http://schemas.microsoft.com/office/infopath/2007/PartnerControls"/>
+    <ds:schemaRef ds:uri="http://schemas.openxmlformats.org/package/2006/metadata/core-properties"/>
+    <ds:schemaRef ds:uri="http://www.w3.org/XML/1998/namespace"/>
+  </ds:schemaRefs>
+</ds:datastoreItem>
 </file>
 
-<file path=customXml/item3.xml><?xml version="1.0" encoding="utf-8"?>
-<p:properties xmlns:p="http://schemas.microsoft.com/office/2006/metadata/properties" xmlns:xsi="http://www.w3.org/2001/XMLSchema-instance" xmlns:pc="http://schemas.microsoft.com/office/infopath/2007/PartnerControls">
-  <documentManagement>
-    <LocPublishedLinkedAssetsLookup xmlns="4873beb7-5857-4685-be1f-d57550cc96cc" xsi:nil="true"/>
-    <ApprovalStatus xmlns="4873beb7-5857-4685-be1f-d57550cc96cc">InProgress</ApprovalStatus>
-    <MarketSpecific xmlns="4873beb7-5857-4685-be1f-d57550cc96cc">false</MarketSpecific>
-    <LocComments xmlns="4873beb7-5857-4685-be1f-d57550cc96cc" xsi:nil="true"/>
-    <LocLastLocAttemptVersionTypeLookup xmlns="4873beb7-5857-4685-be1f-d57550cc96cc" xsi:nil="true"/>
-    <DirectSourceMarket xmlns="4873beb7-5857-4685-be1f-d57550cc96cc" xsi:nil="true"/>
-    <ThumbnailAssetId xmlns="4873beb7-5857-4685-be1f-d57550cc96cc" xsi:nil="true"/>
-    <PrimaryImageGen xmlns="4873beb7-5857-4685-be1f-d57550cc96cc">false</PrimaryImageGen>
-    <LocNewPublishedVersionLookup xmlns="4873beb7-5857-4685-be1f-d57550cc96cc" xsi:nil="true"/>
-    <LegacyData xmlns="4873beb7-5857-4685-be1f-d57550cc96cc" xsi:nil="true"/>
-    <LocRecommendedHandoff xmlns="4873beb7-5857-4685-be1f-d57550cc96cc" xsi:nil="true"/>
-    <BusinessGroup xmlns="4873beb7-5857-4685-be1f-d57550cc96cc" xsi:nil="true"/>
-    <BlockPublish xmlns="4873beb7-5857-4685-be1f-d57550cc96cc">false</BlockPublish>
-    <TPFriendlyName xmlns="4873beb7-5857-4685-be1f-d57550cc96cc" xsi:nil="true"/>
-    <LocOverallPublishStatusLookup xmlns="4873beb7-5857-4685-be1f-d57550cc96cc" xsi:nil="true"/>
-    <NumericId xmlns="4873beb7-5857-4685-be1f-d57550cc96cc" xsi:nil="true"/>
-    <APEditor xmlns="4873beb7-5857-4685-be1f-d57550cc96cc">
-      <UserInfo>
-        <DisplayName/>
-        <AccountId xsi:nil="true"/>
-        <AccountType/>
-      </UserInfo>
-    </APEditor>
-    <SourceTitle xmlns="4873beb7-5857-4685-be1f-d57550cc96cc" xsi:nil="true"/>
-    <OpenTemplate xmlns="4873beb7-5857-4685-be1f-d57550cc96cc">true</OpenTemplate>
-    <LocOverallLocStatusLookup xmlns="4873beb7-5857-4685-be1f-d57550cc96cc" xsi:nil="true"/>
-    <UALocComments xmlns="4873beb7-5857-4685-be1f-d57550cc96cc" xsi:nil="true"/>
-    <ParentAssetId xmlns="4873beb7-5857-4685-be1f-d57550cc96cc" xsi:nil="true"/>
-    <IntlLangReviewDate xmlns="4873beb7-5857-4685-be1f-d57550cc96cc" xsi:nil="true"/>
-    <FeatureTagsTaxHTField0 xmlns="4873beb7-5857-4685-be1f-d57550cc96cc">
-      <Terms xmlns="http://schemas.microsoft.com/office/infopath/2007/PartnerControls"/>
-    </FeatureTagsTaxHTField0>
-    <PublishStatusLookup xmlns="4873beb7-5857-4685-be1f-d57550cc96cc">
-      <Value>1345093</Value>
-    </PublishStatusLookup>
-    <Providers xmlns="4873beb7-5857-4685-be1f-d57550cc96cc" xsi:nil="true"/>
-    <MachineTranslated xmlns="4873beb7-5857-4685-be1f-d57550cc96cc">false</MachineTranslated>
-    <OriginalSourceMarket xmlns="4873beb7-5857-4685-be1f-d57550cc96cc" xsi:nil="true"/>
-    <APDescription xmlns="4873beb7-5857-4685-be1f-d57550cc96cc">This simple template design works for technology and  businesses, but it's versatile enough to use in other contexts.  It features multiple slide layouts designed for widescreen (16x9 resolution) and includes a sample SmartArt list and chart that are easily editable.</APDescription>
-    <ClipArtFilename xmlns="4873beb7-5857-4685-be1f-d57550cc96cc" xsi:nil="true"/>
-    <ContentItem xmlns="4873beb7-5857-4685-be1f-d57550cc96cc" xsi:nil="true"/>
-    <TPInstallLocation xmlns="4873beb7-5857-4685-be1f-d57550cc96cc" xsi:nil="true"/>
-    <PublishTargets xmlns="4873beb7-5857-4685-be1f-d57550cc96cc">OfficeOnlineVNext</PublishTargets>
-    <TimesCloned xmlns="4873beb7-5857-4685-be1f-d57550cc96cc" xsi:nil="true"/>
-    <AssetStart xmlns="4873beb7-5857-4685-be1f-d57550cc96cc">2011-11-26T00:30:00+00:00</AssetStart>
-    <Provider xmlns="4873beb7-5857-4685-be1f-d57550cc96cc" xsi:nil="true"/>
-    <AcquiredFrom xmlns="4873beb7-5857-4685-be1f-d57550cc96cc">Internal MS</AcquiredFrom>
-    <FriendlyTitle xmlns="4873beb7-5857-4685-be1f-d57550cc96cc" xsi:nil="true"/>
-    <LastHandOff xmlns="4873beb7-5857-4685-be1f-d57550cc96cc" xsi:nil="true"/>
-    <TPClientViewer xmlns="4873beb7-5857-4685-be1f-d57550cc96cc" xsi:nil="true"/>
-    <TemplateStatus xmlns="4873beb7-5857-4685-be1f-d57550cc96cc">Complete</TemplateStatus>
-    <Downloads xmlns="4873beb7-5857-4685-be1f-d57550cc96cc">0</Downloads>
-    <OOCacheId xmlns="4873beb7-5857-4685-be1f-d57550cc96cc" xsi:nil="true"/>
-    <IsDeleted xmlns="4873beb7-5857-4685-be1f-d57550cc96cc">false</IsDeleted>
-    <LocPublishedDependentAssetsLookup xmlns="4873beb7-5857-4685-be1f-d57550cc96cc" xsi:nil="true"/>
-    <TPExecutable xmlns="4873beb7-5857-4685-be1f-d57550cc96cc" xsi:nil="true"/>
-    <EditorialTags xmlns="4873beb7-5857-4685-be1f-d57550cc96cc" xsi:nil="true"/>
-    <SubmitterId xmlns="4873beb7-5857-4685-be1f-d57550cc96cc" xsi:nil="true"/>
-    <ApprovalLog xmlns="4873beb7-5857-4685-be1f-d57550cc96cc" xsi:nil="true"/>
-    <AssetType xmlns="4873beb7-5857-4685-be1f-d57550cc96cc">TP</AssetType>
-    <BugNumber xmlns="4873beb7-5857-4685-be1f-d57550cc96cc" xsi:nil="true"/>
-    <CSXSubmissionDate xmlns="4873beb7-5857-4685-be1f-d57550cc96cc" xsi:nil="true"/>
-    <CSXUpdate xmlns="4873beb7-5857-4685-be1f-d57550cc96cc">false</CSXUpdate>
-    <Milestone xmlns="4873beb7-5857-4685-be1f-d57550cc96cc" xsi:nil="true"/>
-    <RecommendationsModifier xmlns="4873beb7-5857-4685-be1f-d57550cc96cc" xsi:nil="true"/>
-    <OriginAsset xmlns="4873beb7-5857-4685-be1f-d57550cc96cc" xsi:nil="true"/>
-    <TPComponent xmlns="4873beb7-5857-4685-be1f-d57550cc96cc" xsi:nil="true"/>
-    <AssetId xmlns="4873beb7-5857-4685-be1f-d57550cc96cc">TP102787989</AssetId>
-    <IntlLocPriority xmlns="4873beb7-5857-4685-be1f-d57550cc96cc" xsi:nil="true"/>
-    <PolicheckWords xmlns="4873beb7-5857-4685-be1f-d57550cc96cc" xsi:nil="true"/>
-    <TPLaunchHelpLink xmlns="4873beb7-5857-4685-be1f-d57550cc96cc" xsi:nil="true"/>
-    <TPApplication xmlns="4873beb7-5857-4685-be1f-d57550cc96cc" xsi:nil="true"/>
-    <CrawlForDependencies xmlns="4873beb7-5857-4685-be1f-d57550cc96cc">false</CrawlForDependencies>
-    <HandoffToMSDN xmlns="4873beb7-5857-4685-be1f-d57550cc96cc" xsi:nil="true"/>
-    <PlannedPubDate xmlns="4873beb7-5857-4685-be1f-d57550cc96cc" xsi:nil="true"/>
-    <IntlLangReviewer xmlns="4873beb7-5857-4685-be1f-d57550cc96cc" xsi:nil="true"/>
-    <TrustLevel xmlns="4873beb7-5857-4685-be1f-d57550cc96cc">1 Microsoft Managed Content</TrustLevel>
-    <LocLastLocAttemptVersionLookup xmlns="4873beb7-5857-4685-be1f-d57550cc96cc">694266</LocLastLocAttemptVersionLookup>
-    <LocProcessedForHandoffsLookup xmlns="4873beb7-5857-4685-be1f-d57550cc96cc" xsi:nil="true"/>
-    <IsSearchable xmlns="4873beb7-5857-4685-be1f-d57550cc96cc">true</IsSearchable>
-    <TemplateTemplateType xmlns="4873beb7-5857-4685-be1f-d57550cc96cc">PowerPoint Presentation Template</TemplateTemplateType>
-    <CampaignTagsTaxHTField0 xmlns="4873beb7-5857-4685-be1f-d57550cc96cc">
-      <Terms xmlns="http://schemas.microsoft.com/office/infopath/2007/PartnerControls"/>
-    </CampaignTagsTaxHTField0>
-    <TPNamespace xmlns="4873beb7-5857-4685-be1f-d57550cc96cc" xsi:nil="true"/>
-    <LocOverallPreviewStatusLookup xmlns="4873beb7-5857-4685-be1f-d57550cc96cc" xsi:nil="true"/>
-    <TaxCatchAll xmlns="4873beb7-5857-4685-be1f-d57550cc96cc"/>
-    <Markets xmlns="4873beb7-5857-4685-be1f-d57550cc96cc"/>
-    <UAProjectedTotalWords xmlns="4873beb7-5857-4685-be1f-d57550cc96cc" xsi:nil="true"/>
-    <IntlLangReview xmlns="4873beb7-5857-4685-be1f-d57550cc96cc" xsi:nil="true"/>
-    <OutputCachingOn xmlns="4873beb7-5857-4685-be1f-d57550cc96cc">false</OutputCachingOn>
-    <AverageRating xmlns="4873beb7-5857-4685-be1f-d57550cc96cc" xsi:nil="true"/>
-    <APAuthor xmlns="4873beb7-5857-4685-be1f-d57550cc96cc">
-      <UserInfo>
-        <DisplayName>REDMOND\kristaa</DisplayName>
-        <AccountId>136</AccountId>
-        <AccountType/>
-      </UserInfo>
-    </APAuthor>
-    <LocManualTestRequired xmlns="4873beb7-5857-4685-be1f-d57550cc96cc">false</LocManualTestRequired>
-    <TPCommandLine xmlns="4873beb7-5857-4685-be1f-d57550cc96cc" xsi:nil="true"/>
-    <TPAppVersion xmlns="4873beb7-5857-4685-be1f-d57550cc96cc" xsi:nil="true"/>
-    <EditorialStatus xmlns="4873beb7-5857-4685-be1f-d57550cc96cc">Complete</EditorialStatus>
-    <LastModifiedDateTime xmlns="4873beb7-5857-4685-be1f-d57550cc96cc" xsi:nil="true"/>
-    <ScenarioTagsTaxHTField0 xmlns="4873beb7-5857-4685-be1f-d57550cc96cc">
-      <Terms xmlns="http://schemas.microsoft.com/office/infopath/2007/PartnerControls"/>
-    </ScenarioTagsTaxHTField0>
-    <LocProcessedForMarketsLookup xmlns="4873beb7-5857-4685-be1f-d57550cc96cc" xsi:nil="true"/>
-    <TPLaunchHelpLinkType xmlns="4873beb7-5857-4685-be1f-d57550cc96cc">Template</TPLaunchHelpLinkType>
-    <OriginalRelease xmlns="4873beb7-5857-4685-be1f-d57550cc96cc">15</OriginalRelease>
-    <LocalizationTagsTaxHTField0 xmlns="4873beb7-5857-4685-be1f-d57550cc96cc">
-      <Terms xmlns="http://schemas.microsoft.com/office/infopath/2007/PartnerControls"/>
-    </LocalizationTagsTaxHTField0>
-    <UACurrentWords xmlns="4873beb7-5857-4685-be1f-d57550cc96cc" xsi:nil="true"/>
-    <ArtSampleDocs xmlns="4873beb7-5857-4685-be1f-d57550cc96cc" xsi:nil="true"/>
-    <UALocRecommendation xmlns="4873beb7-5857-4685-be1f-d57550cc96cc">Localize</UALocRecommendation>
-    <Manager xmlns="4873beb7-5857-4685-be1f-d57550cc96cc" xsi:nil="true"/>
-    <LocOverallHandbackStatusLookup xmlns="4873beb7-5857-4685-be1f-d57550cc96cc" xsi:nil="true"/>
-    <ShowIn xmlns="4873beb7-5857-4685-be1f-d57550cc96cc">Show everywhere</ShowIn>
-    <UANotes xmlns="4873beb7-5857-4685-be1f-d57550cc96cc" xsi:nil="true"/>
-    <InternalTagsTaxHTField0 xmlns="4873beb7-5857-4685-be1f-d57550cc96cc">
-      <Terms xmlns="http://schemas.microsoft.com/office/infopath/2007/PartnerControls"/>
-    </InternalTagsTaxHTField0>
-    <CSXHash xmlns="4873beb7-5857-4685-be1f-d57550cc96cc" xsi:nil="true"/>
-    <VoteCount xmlns="4873beb7-5857-4685-be1f-d57550cc96cc" xsi:nil="true"/>
-    <AssetExpire xmlns="4873beb7-5857-4685-be1f-d57550cc96cc">2029-05-12T07:00:00+00:00</AssetExpire>
-    <DSATActionTaken xmlns="4873beb7-5857-4685-be1f-d57550cc96cc" xsi:nil="true"/>
-    <CSXSubmissionMarket xmlns="4873beb7-5857-4685-be1f-d57550cc96cc" xsi:nil="true"/>
-    <LocMarketGroupTiers2 xmlns="4873beb7-5857-4685-be1f-d57550cc96cc" xsi:nil="true"/>
-  </documentManagement>
-</p:properties>
+<file path=customXml/itemProps2.xml><?xml version="1.0" encoding="utf-8"?>
+<ds:datastoreItem xmlns:ds="http://schemas.openxmlformats.org/officeDocument/2006/customXml" ds:itemID="{3836F65B-1B07-41EE-A0E8-BC6EF3855225}">
+  <ds:schemaRefs>
+    <ds:schemaRef ds:uri="http://schemas.microsoft.com/sharepoint/v3/contenttype/forms"/>
+  </ds:schemaRefs>
+</ds:datastoreItem>
 </file>
 
-<file path=customXml/itemProps1.xml><?xml version="1.0" encoding="utf-8"?>
+<file path=customXml/itemProps3.xml><?xml version="1.0" encoding="utf-8"?>
 <ds:datastoreItem xmlns:ds="http://schemas.openxmlformats.org/officeDocument/2006/customXml" ds:itemID="{A09BF4D4-EF60-4196-BFC3-9462D607978C}">
   <ds:schemaRefs>
     <ds:schemaRef ds:uri="http://schemas.microsoft.com/office/2006/metadata/contentType"/>
@@ -8489,28 +8627,4 @@
     <ds:schemaRef ds:uri="http://schemas.microsoft.com/internal/obd"/>
   </ds:schemaRefs>
 </ds:datastoreItem>
-</file>
-
-<file path=customXml/itemProps2.xml><?xml version="1.0" encoding="utf-8"?>
-<ds:datastoreItem xmlns:ds="http://schemas.openxmlformats.org/officeDocument/2006/customXml" ds:itemID="{3836F65B-1B07-41EE-A0E8-BC6EF3855225}">
-  <ds:schemaRefs>
-    <ds:schemaRef ds:uri="http://schemas.microsoft.com/sharepoint/v3/contenttype/forms"/>
-  </ds:schemaRefs>
-</ds:datastoreItem>
-</file>
-
-<file path=customXml/itemProps3.xml><?xml version="1.0" encoding="utf-8"?>
-<ds:datastoreItem xmlns:ds="http://schemas.openxmlformats.org/officeDocument/2006/customXml" ds:itemID="{60C67BEE-D13F-4BD2-98A5-34D8A0977F68}">
-  <ds:schemaRefs>
-    <ds:schemaRef ds:uri="4873beb7-5857-4685-be1f-d57550cc96cc"/>
-    <ds:schemaRef ds:uri="http://schemas.openxmlformats.org/package/2006/metadata/core-properties"/>
-    <ds:schemaRef ds:uri="http://purl.org/dc/terms/"/>
-    <ds:schemaRef ds:uri="http://schemas.microsoft.com/office/2006/documentManagement/types"/>
-    <ds:schemaRef ds:uri="http://purl.org/dc/elements/1.1/"/>
-    <ds:schemaRef ds:uri="http://schemas.microsoft.com/office/2006/metadata/properties"/>
-    <ds:schemaRef ds:uri="http://schemas.microsoft.com/office/infopath/2007/PartnerControls"/>
-    <ds:schemaRef ds:uri="http://www.w3.org/XML/1998/namespace"/>
-    <ds:schemaRef ds:uri="http://purl.org/dc/dcmitype/"/>
-  </ds:schemaRefs>
-</ds:datastoreItem>
 </file>
</xml_diff>